<commit_message>
feat: invalid session w/ oidc workflow
</commit_message>
<xml_diff>
--- a/docs/img/nginx-oidc-flow.pptx
+++ b/docs/img/nginx-oidc-flow.pptx
@@ -4387,7 +4387,7 @@
         <p:spPr>
           <a:xfrm>
             <a:off x="4112682" y="2592066"/>
-            <a:ext cx="702115" cy="123111"/>
+            <a:ext cx="703719" cy="153888"/>
           </a:xfrm>
           <a:prstGeom prst="rect">
             <a:avLst/>
@@ -4400,10 +4400,22 @@
           <a:lstStyle/>
           <a:p>
             <a:r>
+              <a:rPr lang="en-US" sz="1000" dirty="0">
+                <a:latin typeface="Wingdings 2" pitchFamily="2" charset="2"/>
+                <a:ea typeface="Malgun Gothic" panose="020B0503020000020004" pitchFamily="34" charset="-127"/>
+                <a:cs typeface="Times New Roman" panose="02020603050405020304" pitchFamily="18" charset="0"/>
+              </a:rPr>
+              <a:t>u</a:t>
+            </a:r>
+            <a:r>
+              <a:rPr lang="en-US" sz="800" dirty="0"/>
+              <a:t> </a:t>
+            </a:r>
+            <a:r>
               <a:rPr lang="en-US" altLang="ko-KR" sz="800" dirty="0">
                 <a:latin typeface="Calibri" panose="020F0502020204030204" pitchFamily="34" charset="0"/>
               </a:rPr>
-              <a:t>(1) Login request</a:t>
+              <a:t>Login request</a:t>
             </a:r>
             <a:endParaRPr lang="ko-KR" altLang="en-US" sz="800" dirty="0">
               <a:latin typeface="Calibri" panose="020F0502020204030204" pitchFamily="34" charset="0"/>
@@ -4426,7 +4438,7 @@
         <p:spPr>
           <a:xfrm>
             <a:off x="5284941" y="2924180"/>
-            <a:ext cx="679673" cy="123111"/>
+            <a:ext cx="681277" cy="153888"/>
           </a:xfrm>
           <a:prstGeom prst="rect">
             <a:avLst/>
@@ -4439,10 +4451,22 @@
           <a:lstStyle/>
           <a:p>
             <a:r>
+              <a:rPr lang="en-US" sz="1000" dirty="0">
+                <a:latin typeface="Wingdings 2" pitchFamily="2" charset="2"/>
+                <a:ea typeface="Malgun Gothic" panose="020B0503020000020004" pitchFamily="34" charset="-127"/>
+                <a:cs typeface="Times New Roman" panose="02020603050405020304" pitchFamily="18" charset="0"/>
+              </a:rPr>
+              <a:t>v</a:t>
+            </a:r>
+            <a:r>
+              <a:rPr lang="en-US" sz="800" dirty="0"/>
+              <a:t> </a:t>
+            </a:r>
+            <a:r>
               <a:rPr lang="en-US" altLang="ko-KR" sz="800" dirty="0">
                 <a:latin typeface="Calibri" panose="020F0502020204030204" pitchFamily="34" charset="0"/>
               </a:rPr>
-              <a:t>(2) Auth request</a:t>
+              <a:t>Auth request</a:t>
             </a:r>
             <a:endParaRPr lang="ko-KR" altLang="en-US" sz="800" dirty="0">
               <a:latin typeface="Calibri" panose="020F0502020204030204" pitchFamily="34" charset="0"/>
@@ -4544,7 +4568,7 @@
         <p:spPr>
           <a:xfrm>
             <a:off x="6286271" y="1381299"/>
-            <a:ext cx="872212" cy="396391"/>
+            <a:ext cx="872212" cy="421013"/>
           </a:xfrm>
           <a:prstGeom prst="rect">
             <a:avLst/>
@@ -4562,6 +4586,18 @@
                 <a:spcPct val="80000"/>
               </a:lnSpc>
             </a:pPr>
+            <a:r>
+              <a:rPr lang="en-US" sz="1000" dirty="0">
+                <a:latin typeface="Wingdings 2" pitchFamily="2" charset="2"/>
+                <a:ea typeface="Malgun Gothic" panose="020B0503020000020004" pitchFamily="34" charset="-127"/>
+                <a:cs typeface="Times New Roman" panose="02020603050405020304" pitchFamily="18" charset="0"/>
+              </a:rPr>
+              <a:t>w</a:t>
+            </a:r>
+            <a:r>
+              <a:rPr lang="en-US" sz="800" dirty="0"/>
+              <a:t> </a:t>
+            </a:r>
             <a:r>
               <a:rPr lang="en-US" altLang="ko-KR" sz="800" dirty="0">
                 <a:solidFill>
@@ -4569,7 +4605,7 @@
                 </a:solidFill>
                 <a:latin typeface="Calibri" panose="020F0502020204030204" pitchFamily="34" charset="0"/>
               </a:rPr>
-              <a:t>(3) (11) NGINX Plus exchanges authorization code for ID / access token</a:t>
+              <a:t>(11) NGINX Plus exchanges authorization code for ID / access token</a:t>
             </a:r>
             <a:endParaRPr lang="ko-KR" altLang="en-US" sz="800" dirty="0">
               <a:solidFill>
@@ -4641,8 +4677,8 @@
         </p:nvSpPr>
         <p:spPr>
           <a:xfrm>
-            <a:off x="4047124" y="2965122"/>
-            <a:ext cx="679991" cy="246221"/>
+            <a:off x="4047124" y="2946333"/>
+            <a:ext cx="679991" cy="276999"/>
           </a:xfrm>
           <a:prstGeom prst="rect">
             <a:avLst/>
@@ -4656,10 +4692,22 @@
           <a:p>
             <a:pPr algn="r"/>
             <a:r>
+              <a:rPr lang="en-US" sz="1000" dirty="0">
+                <a:latin typeface="Wingdings 2" pitchFamily="2" charset="2"/>
+                <a:ea typeface="Malgun Gothic" panose="020B0503020000020004" pitchFamily="34" charset="-127"/>
+                <a:cs typeface="Times New Roman" panose="02020603050405020304" pitchFamily="18" charset="0"/>
+              </a:rPr>
+              <a:t>x</a:t>
+            </a:r>
+            <a:r>
+              <a:rPr lang="en-US" sz="800" dirty="0"/>
+              <a:t> </a:t>
+            </a:r>
+            <a:r>
               <a:rPr lang="en-US" altLang="ko-KR" sz="800" dirty="0">
                 <a:latin typeface="Calibri" panose="020F0502020204030204" pitchFamily="34" charset="0"/>
               </a:rPr>
-              <a:t>(4) Redirect to original URI</a:t>
+              <a:t>Redirect to original URI</a:t>
             </a:r>
             <a:endParaRPr lang="ko-KR" altLang="en-US" sz="800" dirty="0">
               <a:latin typeface="Calibri" panose="020F0502020204030204" pitchFamily="34" charset="0"/>

</xml_diff>

<commit_message>
fix: NGINX Plus OIDC workflow w/ Auth0
</commit_message>
<xml_diff>
--- a/docs/img/nginx-oidc-flow.pptx
+++ b/docs/img/nginx-oidc-flow.pptx
@@ -259,7 +259,7 @@
           <a:p>
             <a:fld id="{FD36D0CE-793F-FB41-AD4F-0C45D94A4FBD}" type="datetimeFigureOut">
               <a:rPr lang="en-US" smtClean="0"/>
-              <a:t>9/2/22</a:t>
+              <a:t>9/15/22</a:t>
             </a:fld>
             <a:endParaRPr lang="en-US"/>
           </a:p>
@@ -457,7 +457,7 @@
           <a:p>
             <a:fld id="{FD36D0CE-793F-FB41-AD4F-0C45D94A4FBD}" type="datetimeFigureOut">
               <a:rPr lang="en-US" smtClean="0"/>
-              <a:t>9/2/22</a:t>
+              <a:t>9/15/22</a:t>
             </a:fld>
             <a:endParaRPr lang="en-US"/>
           </a:p>
@@ -665,7 +665,7 @@
           <a:p>
             <a:fld id="{FD36D0CE-793F-FB41-AD4F-0C45D94A4FBD}" type="datetimeFigureOut">
               <a:rPr lang="en-US" smtClean="0"/>
-              <a:t>9/2/22</a:t>
+              <a:t>9/15/22</a:t>
             </a:fld>
             <a:endParaRPr lang="en-US"/>
           </a:p>
@@ -863,7 +863,7 @@
           <a:p>
             <a:fld id="{FD36D0CE-793F-FB41-AD4F-0C45D94A4FBD}" type="datetimeFigureOut">
               <a:rPr lang="en-US" smtClean="0"/>
-              <a:t>9/2/22</a:t>
+              <a:t>9/15/22</a:t>
             </a:fld>
             <a:endParaRPr lang="en-US"/>
           </a:p>
@@ -1138,7 +1138,7 @@
           <a:p>
             <a:fld id="{FD36D0CE-793F-FB41-AD4F-0C45D94A4FBD}" type="datetimeFigureOut">
               <a:rPr lang="en-US" smtClean="0"/>
-              <a:t>9/2/22</a:t>
+              <a:t>9/15/22</a:t>
             </a:fld>
             <a:endParaRPr lang="en-US"/>
           </a:p>
@@ -1403,7 +1403,7 @@
           <a:p>
             <a:fld id="{FD36D0CE-793F-FB41-AD4F-0C45D94A4FBD}" type="datetimeFigureOut">
               <a:rPr lang="en-US" smtClean="0"/>
-              <a:t>9/2/22</a:t>
+              <a:t>9/15/22</a:t>
             </a:fld>
             <a:endParaRPr lang="en-US"/>
           </a:p>
@@ -1815,7 +1815,7 @@
           <a:p>
             <a:fld id="{FD36D0CE-793F-FB41-AD4F-0C45D94A4FBD}" type="datetimeFigureOut">
               <a:rPr lang="en-US" smtClean="0"/>
-              <a:t>9/2/22</a:t>
+              <a:t>9/15/22</a:t>
             </a:fld>
             <a:endParaRPr lang="en-US"/>
           </a:p>
@@ -1956,7 +1956,7 @@
           <a:p>
             <a:fld id="{FD36D0CE-793F-FB41-AD4F-0C45D94A4FBD}" type="datetimeFigureOut">
               <a:rPr lang="en-US" smtClean="0"/>
-              <a:t>9/2/22</a:t>
+              <a:t>9/15/22</a:t>
             </a:fld>
             <a:endParaRPr lang="en-US"/>
           </a:p>
@@ -2069,7 +2069,7 @@
           <a:p>
             <a:fld id="{FD36D0CE-793F-FB41-AD4F-0C45D94A4FBD}" type="datetimeFigureOut">
               <a:rPr lang="en-US" smtClean="0"/>
-              <a:t>9/2/22</a:t>
+              <a:t>9/15/22</a:t>
             </a:fld>
             <a:endParaRPr lang="en-US"/>
           </a:p>
@@ -2380,7 +2380,7 @@
           <a:p>
             <a:fld id="{FD36D0CE-793F-FB41-AD4F-0C45D94A4FBD}" type="datetimeFigureOut">
               <a:rPr lang="en-US" smtClean="0"/>
-              <a:t>9/2/22</a:t>
+              <a:t>9/15/22</a:t>
             </a:fld>
             <a:endParaRPr lang="en-US"/>
           </a:p>
@@ -2668,7 +2668,7 @@
           <a:p>
             <a:fld id="{FD36D0CE-793F-FB41-AD4F-0C45D94A4FBD}" type="datetimeFigureOut">
               <a:rPr lang="en-US" smtClean="0"/>
-              <a:t>9/2/22</a:t>
+              <a:t>9/15/22</a:t>
             </a:fld>
             <a:endParaRPr lang="en-US"/>
           </a:p>
@@ -2909,7 +2909,7 @@
           <a:p>
             <a:fld id="{FD36D0CE-793F-FB41-AD4F-0C45D94A4FBD}" type="datetimeFigureOut">
               <a:rPr lang="en-US" smtClean="0"/>
-              <a:t>9/2/22</a:t>
+              <a:t>9/15/22</a:t>
             </a:fld>
             <a:endParaRPr lang="en-US"/>
           </a:p>
@@ -3328,10 +3328,10 @@
       </p:grpSpPr>
       <p:sp>
         <p:nvSpPr>
-          <p:cNvPr id="4" name="직사각형 363">
-            <a:extLst>
-              <a:ext uri="{FF2B5EF4-FFF2-40B4-BE49-F238E27FC236}">
-                <a16:creationId xmlns:a16="http://schemas.microsoft.com/office/drawing/2014/main" id="{958FFFD7-5D4D-A277-1D8D-DE96FB8B7084}"/>
+          <p:cNvPr id="101" name="직사각형 363">
+            <a:extLst>
+              <a:ext uri="{FF2B5EF4-FFF2-40B4-BE49-F238E27FC236}">
+                <a16:creationId xmlns:a16="http://schemas.microsoft.com/office/drawing/2014/main" id="{ECB244C3-D1C1-CCDD-EA74-6A5C774106C6}"/>
               </a:ext>
             </a:extLst>
           </p:cNvPr>
@@ -3340,8 +3340,8 @@
         </p:nvSpPr>
         <p:spPr>
           <a:xfrm>
-            <a:off x="2757805" y="1369379"/>
-            <a:ext cx="1309937" cy="3677003"/>
+            <a:off x="7238521" y="1369379"/>
+            <a:ext cx="1309937" cy="1244245"/>
           </a:xfrm>
           <a:prstGeom prst="rect">
             <a:avLst/>
@@ -3395,7 +3395,7 @@
                 <a:latin typeface="Calibri" panose="020F0502020204030204" pitchFamily="34" charset="0"/>
                 <a:ea typeface="맑은 고딕"/>
               </a:rPr>
-              <a:t>Frontend App</a:t>
+              <a:t>IdP</a:t>
             </a:r>
             <a:endParaRPr kumimoji="0" lang="ko-KR" altLang="en-US" sz="1200" b="1" i="0" u="none" strike="noStrike" kern="0" cap="none" spc="0" normalizeH="0" baseline="0" noProof="0" dirty="0">
               <a:ln>
@@ -3417,10 +3417,129 @@
       </p:sp>
       <p:pic>
         <p:nvPicPr>
-          <p:cNvPr id="5" name="Picture 4">
-            <a:extLst>
-              <a:ext uri="{FF2B5EF4-FFF2-40B4-BE49-F238E27FC236}">
-                <a16:creationId xmlns:a16="http://schemas.microsoft.com/office/drawing/2014/main" id="{38756B38-FEAE-7273-75D6-53F230089685}"/>
+          <p:cNvPr id="53" name="Picture 52">
+            <a:extLst>
+              <a:ext uri="{FF2B5EF4-FFF2-40B4-BE49-F238E27FC236}">
+                <a16:creationId xmlns:a16="http://schemas.microsoft.com/office/drawing/2014/main" id="{4B9686DF-FFFA-960D-E898-10ACD996ED84}"/>
+              </a:ext>
+            </a:extLst>
+          </p:cNvPr>
+          <p:cNvPicPr>
+            <a:picLocks noChangeAspect="1"/>
+          </p:cNvPicPr>
+          <p:nvPr/>
+        </p:nvPicPr>
+        <p:blipFill>
+          <a:blip r:embed="rId2"/>
+          <a:stretch>
+            <a:fillRect/>
+          </a:stretch>
+        </p:blipFill>
+        <p:spPr>
+          <a:xfrm>
+            <a:off x="7432175" y="1873203"/>
+            <a:ext cx="842591" cy="305632"/>
+          </a:xfrm>
+          <a:prstGeom prst="rect">
+            <a:avLst/>
+          </a:prstGeom>
+        </p:spPr>
+      </p:pic>
+      <p:sp>
+        <p:nvSpPr>
+          <p:cNvPr id="3" name="직사각형 363">
+            <a:extLst>
+              <a:ext uri="{FF2B5EF4-FFF2-40B4-BE49-F238E27FC236}">
+                <a16:creationId xmlns:a16="http://schemas.microsoft.com/office/drawing/2014/main" id="{D4D80966-734E-0158-0337-D01F28F52AFA}"/>
+              </a:ext>
+            </a:extLst>
+          </p:cNvPr>
+          <p:cNvSpPr/>
+          <p:nvPr/>
+        </p:nvSpPr>
+        <p:spPr>
+          <a:xfrm>
+            <a:off x="2757805" y="1369379"/>
+            <a:ext cx="1309937" cy="3677003"/>
+          </a:xfrm>
+          <a:prstGeom prst="rect">
+            <a:avLst/>
+          </a:prstGeom>
+          <a:solidFill>
+            <a:schemeClr val="bg1"/>
+          </a:solidFill>
+          <a:ln w="3175" cap="flat" cmpd="sng" algn="ctr">
+            <a:solidFill>
+              <a:schemeClr val="bg1">
+                <a:lumMod val="75000"/>
+              </a:schemeClr>
+            </a:solidFill>
+            <a:prstDash val="dash"/>
+            <a:miter lim="800000"/>
+          </a:ln>
+          <a:effectLst/>
+        </p:spPr>
+        <p:txBody>
+          <a:bodyPr lIns="0" rIns="0" rtlCol="0" anchor="t" anchorCtr="0"/>
+          <a:lstStyle/>
+          <a:p>
+            <a:pPr marL="0" marR="0" lvl="0" indent="0" algn="ctr" defTabSz="914400" eaLnBrk="1" fontAlgn="auto" latinLnBrk="0" hangingPunct="1">
+              <a:lnSpc>
+                <a:spcPct val="100000"/>
+              </a:lnSpc>
+              <a:spcBef>
+                <a:spcPts val="0"/>
+              </a:spcBef>
+              <a:spcAft>
+                <a:spcPts val="0"/>
+              </a:spcAft>
+              <a:buClrTx/>
+              <a:buSzTx/>
+              <a:buFontTx/>
+              <a:buNone/>
+              <a:tabLst/>
+              <a:defRPr/>
+            </a:pPr>
+            <a:r>
+              <a:rPr kumimoji="0" lang="en-US" altLang="ko-KR" sz="1200" b="1" i="0" u="none" strike="noStrike" kern="0" cap="none" spc="0" normalizeH="0" baseline="0" noProof="0" dirty="0">
+                <a:ln>
+                  <a:noFill/>
+                </a:ln>
+                <a:solidFill>
+                  <a:prstClr val="black"/>
+                </a:solidFill>
+                <a:effectLst/>
+                <a:uLnTx/>
+                <a:uFillTx/>
+                <a:latin typeface="Calibri" panose="020F0502020204030204" pitchFamily="34" charset="0"/>
+                <a:ea typeface="맑은 고딕"/>
+              </a:rPr>
+              <a:t>Frontend App</a:t>
+            </a:r>
+            <a:endParaRPr kumimoji="0" lang="ko-KR" altLang="en-US" sz="1200" b="1" i="0" u="none" strike="noStrike" kern="0" cap="none" spc="0" normalizeH="0" baseline="0" noProof="0" dirty="0">
+              <a:ln>
+                <a:noFill/>
+              </a:ln>
+              <a:solidFill>
+                <a:schemeClr val="bg1">
+                  <a:lumMod val="50000"/>
+                </a:schemeClr>
+              </a:solidFill>
+              <a:effectLst/>
+              <a:uLnTx/>
+              <a:uFillTx/>
+              <a:latin typeface="Calibri" panose="020F0502020204030204" pitchFamily="34" charset="0"/>
+              <a:ea typeface="맑은 고딕"/>
+            </a:endParaRPr>
+          </a:p>
+        </p:txBody>
+      </p:sp>
+      <p:pic>
+        <p:nvPicPr>
+          <p:cNvPr id="54" name="Picture 53">
+            <a:extLst>
+              <a:ext uri="{FF2B5EF4-FFF2-40B4-BE49-F238E27FC236}">
+                <a16:creationId xmlns:a16="http://schemas.microsoft.com/office/drawing/2014/main" id="{12D8E776-4400-72FB-CDC8-DE0DF5953C46}"/>
               </a:ext>
             </a:extLst>
           </p:cNvPr>
@@ -3430,7 +3549,7 @@
           <p:nvPr/>
         </p:nvPicPr>
         <p:blipFill>
-          <a:blip r:embed="rId2">
+          <a:blip r:embed="rId3">
             <a:duotone>
               <a:srgbClr val="E7E6E6">
                 <a:shade val="45000"/>
@@ -3484,10 +3603,10 @@
       </p:pic>
       <p:pic>
         <p:nvPicPr>
-          <p:cNvPr id="6" name="Graphic 5" descr="Web design outline">
-            <a:extLst>
-              <a:ext uri="{FF2B5EF4-FFF2-40B4-BE49-F238E27FC236}">
-                <a16:creationId xmlns:a16="http://schemas.microsoft.com/office/drawing/2014/main" id="{B40D7A4A-ADE3-29BE-B11E-1E9C998D52C0}"/>
+          <p:cNvPr id="55" name="Graphic 54" descr="Web design outline">
+            <a:extLst>
+              <a:ext uri="{FF2B5EF4-FFF2-40B4-BE49-F238E27FC236}">
+                <a16:creationId xmlns:a16="http://schemas.microsoft.com/office/drawing/2014/main" id="{BFE05F06-388F-2629-C31B-35BB53E974EE}"/>
               </a:ext>
             </a:extLst>
           </p:cNvPr>
@@ -3497,10 +3616,10 @@
           <p:nvPr/>
         </p:nvPicPr>
         <p:blipFill>
-          <a:blip r:embed="rId3">
+          <a:blip r:embed="rId4">
             <a:extLst>
               <a:ext uri="{96DAC541-7B7A-43D3-8B79-37D633B846F1}">
-                <asvg:svgBlip xmlns:asvg="http://schemas.microsoft.com/office/drawing/2016/SVG/main" r:embed="rId4"/>
+                <asvg:svgBlip xmlns:asvg="http://schemas.microsoft.com/office/drawing/2016/SVG/main" r:embed="rId5"/>
               </a:ext>
             </a:extLst>
           </a:blip>
@@ -3520,10 +3639,10 @@
       </p:pic>
       <p:sp>
         <p:nvSpPr>
-          <p:cNvPr id="7" name="직사각형 363">
-            <a:extLst>
-              <a:ext uri="{FF2B5EF4-FFF2-40B4-BE49-F238E27FC236}">
-                <a16:creationId xmlns:a16="http://schemas.microsoft.com/office/drawing/2014/main" id="{C14BD48D-865B-1982-B6FE-E3708E8EA136}"/>
+          <p:cNvPr id="56" name="직사각형 363">
+            <a:extLst>
+              <a:ext uri="{FF2B5EF4-FFF2-40B4-BE49-F238E27FC236}">
+                <a16:creationId xmlns:a16="http://schemas.microsoft.com/office/drawing/2014/main" id="{EDBA26F2-DAC5-36C5-BACE-0FC4765841C0}"/>
               </a:ext>
             </a:extLst>
           </p:cNvPr>
@@ -3609,10 +3728,10 @@
       </p:sp>
       <p:pic>
         <p:nvPicPr>
-          <p:cNvPr id="8" name="Picture 2" descr="NGINX Application Platform | NGINX">
-            <a:extLst>
-              <a:ext uri="{FF2B5EF4-FFF2-40B4-BE49-F238E27FC236}">
-                <a16:creationId xmlns:a16="http://schemas.microsoft.com/office/drawing/2014/main" id="{FF38F4F5-01EE-CB9A-F45C-E5039380650E}"/>
+          <p:cNvPr id="57" name="Picture 2" descr="NGINX Application Platform | NGINX">
+            <a:extLst>
+              <a:ext uri="{FF2B5EF4-FFF2-40B4-BE49-F238E27FC236}">
+                <a16:creationId xmlns:a16="http://schemas.microsoft.com/office/drawing/2014/main" id="{6FA4C9A7-D518-C68D-DA50-D27ADB46F60C}"/>
               </a:ext>
             </a:extLst>
           </p:cNvPr>
@@ -3622,7 +3741,7 @@
           <p:nvPr/>
         </p:nvPicPr>
         <p:blipFill>
-          <a:blip r:embed="rId5">
+          <a:blip r:embed="rId6">
             <a:extLst>
               <a:ext uri="{28A0092B-C50C-407E-A947-70E740481C1C}">
                 <a14:useLocalDpi xmlns:a14="http://schemas.microsoft.com/office/drawing/2010/main" val="0"/>
@@ -3656,10 +3775,10 @@
       </p:pic>
       <p:sp>
         <p:nvSpPr>
-          <p:cNvPr id="9" name="직사각형 363">
-            <a:extLst>
-              <a:ext uri="{FF2B5EF4-FFF2-40B4-BE49-F238E27FC236}">
-                <a16:creationId xmlns:a16="http://schemas.microsoft.com/office/drawing/2014/main" id="{A502D831-5077-E9B9-B2B4-24136906F351}"/>
+          <p:cNvPr id="58" name="직사각형 363">
+            <a:extLst>
+              <a:ext uri="{FF2B5EF4-FFF2-40B4-BE49-F238E27FC236}">
+                <a16:creationId xmlns:a16="http://schemas.microsoft.com/office/drawing/2014/main" id="{0E63AA7E-915D-FA8F-226B-3E73A0084F42}"/>
               </a:ext>
             </a:extLst>
           </p:cNvPr>
@@ -3745,10 +3864,10 @@
       </p:sp>
       <p:pic>
         <p:nvPicPr>
-          <p:cNvPr id="10" name="Picture 9">
-            <a:extLst>
-              <a:ext uri="{FF2B5EF4-FFF2-40B4-BE49-F238E27FC236}">
-                <a16:creationId xmlns:a16="http://schemas.microsoft.com/office/drawing/2014/main" id="{22F5C08B-9D15-6D1D-9BBC-D844BE591F7F}"/>
+          <p:cNvPr id="59" name="Picture 58">
+            <a:extLst>
+              <a:ext uri="{FF2B5EF4-FFF2-40B4-BE49-F238E27FC236}">
+                <a16:creationId xmlns:a16="http://schemas.microsoft.com/office/drawing/2014/main" id="{8B481A9A-E19B-57D9-CE36-CEB580AE59AA}"/>
               </a:ext>
             </a:extLst>
           </p:cNvPr>
@@ -3758,7 +3877,7 @@
           <p:nvPr/>
         </p:nvPicPr>
         <p:blipFill>
-          <a:blip r:embed="rId6"/>
+          <a:blip r:embed="rId7"/>
           <a:stretch>
             <a:fillRect/>
           </a:stretch>
@@ -3775,10 +3894,10 @@
       </p:pic>
       <p:sp>
         <p:nvSpPr>
-          <p:cNvPr id="11" name="직사각형 363">
-            <a:extLst>
-              <a:ext uri="{FF2B5EF4-FFF2-40B4-BE49-F238E27FC236}">
-                <a16:creationId xmlns:a16="http://schemas.microsoft.com/office/drawing/2014/main" id="{00C84BAF-2201-7F63-39A4-3283194E5C0A}"/>
+          <p:cNvPr id="60" name="직사각형 363">
+            <a:extLst>
+              <a:ext uri="{FF2B5EF4-FFF2-40B4-BE49-F238E27FC236}">
+                <a16:creationId xmlns:a16="http://schemas.microsoft.com/office/drawing/2014/main" id="{2FE7D81E-F887-7F94-0BD0-DD03E6DB8064}"/>
               </a:ext>
             </a:extLst>
           </p:cNvPr>
@@ -3835,10 +3954,10 @@
       </p:sp>
       <p:sp>
         <p:nvSpPr>
-          <p:cNvPr id="12" name="직사각형 363">
-            <a:extLst>
-              <a:ext uri="{FF2B5EF4-FFF2-40B4-BE49-F238E27FC236}">
-                <a16:creationId xmlns:a16="http://schemas.microsoft.com/office/drawing/2014/main" id="{AC4E0C58-0588-6A85-68A2-27E0F7EDCC54}"/>
+          <p:cNvPr id="61" name="직사각형 363">
+            <a:extLst>
+              <a:ext uri="{FF2B5EF4-FFF2-40B4-BE49-F238E27FC236}">
+                <a16:creationId xmlns:a16="http://schemas.microsoft.com/office/drawing/2014/main" id="{EFF51753-6BA0-3C1B-AE74-AEDC16556681}"/>
               </a:ext>
             </a:extLst>
           </p:cNvPr>
@@ -3892,10 +4011,10 @@
       </p:sp>
       <p:sp>
         <p:nvSpPr>
-          <p:cNvPr id="13" name="직사각형 363">
-            <a:extLst>
-              <a:ext uri="{FF2B5EF4-FFF2-40B4-BE49-F238E27FC236}">
-                <a16:creationId xmlns:a16="http://schemas.microsoft.com/office/drawing/2014/main" id="{9D301FEB-13AC-658C-E6DE-7A90196D5545}"/>
+          <p:cNvPr id="62" name="직사각형 363">
+            <a:extLst>
+              <a:ext uri="{FF2B5EF4-FFF2-40B4-BE49-F238E27FC236}">
+                <a16:creationId xmlns:a16="http://schemas.microsoft.com/office/drawing/2014/main" id="{014B9906-DE28-310D-0658-D8EE0171513C}"/>
               </a:ext>
             </a:extLst>
           </p:cNvPr>
@@ -3945,10 +4064,10 @@
       </p:sp>
       <p:sp>
         <p:nvSpPr>
-          <p:cNvPr id="14" name="직사각형 363">
-            <a:extLst>
-              <a:ext uri="{FF2B5EF4-FFF2-40B4-BE49-F238E27FC236}">
-                <a16:creationId xmlns:a16="http://schemas.microsoft.com/office/drawing/2014/main" id="{BB84727D-7F50-4AE5-4D49-C78FFC4AA8EF}"/>
+          <p:cNvPr id="63" name="직사각형 363">
+            <a:extLst>
+              <a:ext uri="{FF2B5EF4-FFF2-40B4-BE49-F238E27FC236}">
+                <a16:creationId xmlns:a16="http://schemas.microsoft.com/office/drawing/2014/main" id="{5014695F-7E1B-CEE7-C8F9-21D0733EE677}"/>
               </a:ext>
             </a:extLst>
           </p:cNvPr>
@@ -4005,10 +4124,10 @@
       </p:sp>
       <p:sp>
         <p:nvSpPr>
-          <p:cNvPr id="15" name="직사각형 363">
-            <a:extLst>
-              <a:ext uri="{FF2B5EF4-FFF2-40B4-BE49-F238E27FC236}">
-                <a16:creationId xmlns:a16="http://schemas.microsoft.com/office/drawing/2014/main" id="{185CF823-018B-29ED-AF43-59D30E52CA42}"/>
+          <p:cNvPr id="64" name="직사각형 363">
+            <a:extLst>
+              <a:ext uri="{FF2B5EF4-FFF2-40B4-BE49-F238E27FC236}">
+                <a16:creationId xmlns:a16="http://schemas.microsoft.com/office/drawing/2014/main" id="{536D9CD1-B2F0-0622-F559-D21F8B8BEE5D}"/>
               </a:ext>
             </a:extLst>
           </p:cNvPr>
@@ -4084,10 +4203,10 @@
       </p:sp>
       <p:sp>
         <p:nvSpPr>
-          <p:cNvPr id="16" name="직사각형 363">
-            <a:extLst>
-              <a:ext uri="{FF2B5EF4-FFF2-40B4-BE49-F238E27FC236}">
-                <a16:creationId xmlns:a16="http://schemas.microsoft.com/office/drawing/2014/main" id="{56A27B00-52EB-AECD-A9D9-786C2AB8A7E9}"/>
+          <p:cNvPr id="65" name="직사각형 363">
+            <a:extLst>
+              <a:ext uri="{FF2B5EF4-FFF2-40B4-BE49-F238E27FC236}">
+                <a16:creationId xmlns:a16="http://schemas.microsoft.com/office/drawing/2014/main" id="{53D1C737-839A-4722-BF4E-73B28718E176}"/>
               </a:ext>
             </a:extLst>
           </p:cNvPr>
@@ -4144,10 +4263,10 @@
       </p:sp>
       <p:cxnSp>
         <p:nvCxnSpPr>
-          <p:cNvPr id="17" name="Straight Arrow Connector 16">
-            <a:extLst>
-              <a:ext uri="{FF2B5EF4-FFF2-40B4-BE49-F238E27FC236}">
-                <a16:creationId xmlns:a16="http://schemas.microsoft.com/office/drawing/2014/main" id="{5D7994CA-FDBF-0DE8-AF29-CC7432595EC1}"/>
+          <p:cNvPr id="66" name="Straight Arrow Connector 65">
+            <a:extLst>
+              <a:ext uri="{FF2B5EF4-FFF2-40B4-BE49-F238E27FC236}">
+                <a16:creationId xmlns:a16="http://schemas.microsoft.com/office/drawing/2014/main" id="{90910390-39F8-A08C-839F-E9369CA88BF5}"/>
               </a:ext>
             </a:extLst>
           </p:cNvPr>
@@ -4191,10 +4310,10 @@
       </p:cxnSp>
       <p:pic>
         <p:nvPicPr>
-          <p:cNvPr id="18" name="Picture 17">
-            <a:extLst>
-              <a:ext uri="{FF2B5EF4-FFF2-40B4-BE49-F238E27FC236}">
-                <a16:creationId xmlns:a16="http://schemas.microsoft.com/office/drawing/2014/main" id="{E1188E38-BE5D-40A5-415A-EED9DE4C25A0}"/>
+          <p:cNvPr id="67" name="Picture 66">
+            <a:extLst>
+              <a:ext uri="{FF2B5EF4-FFF2-40B4-BE49-F238E27FC236}">
+                <a16:creationId xmlns:a16="http://schemas.microsoft.com/office/drawing/2014/main" id="{40C58BEB-6837-71F0-6AEB-3B73C8BF081F}"/>
               </a:ext>
             </a:extLst>
           </p:cNvPr>
@@ -4204,7 +4323,7 @@
           <p:nvPr/>
         </p:nvPicPr>
         <p:blipFill>
-          <a:blip r:embed="rId7"/>
+          <a:blip r:embed="rId8"/>
           <a:stretch>
             <a:fillRect/>
           </a:stretch>
@@ -4221,16 +4340,16 @@
       </p:pic>
       <p:cxnSp>
         <p:nvCxnSpPr>
-          <p:cNvPr id="19" name="Straight Arrow Connector 18">
-            <a:extLst>
-              <a:ext uri="{FF2B5EF4-FFF2-40B4-BE49-F238E27FC236}">
-                <a16:creationId xmlns:a16="http://schemas.microsoft.com/office/drawing/2014/main" id="{4C334BB3-EA3D-2239-1CD1-64C761FE495B}"/>
+          <p:cNvPr id="68" name="Straight Arrow Connector 67">
+            <a:extLst>
+              <a:ext uri="{FF2B5EF4-FFF2-40B4-BE49-F238E27FC236}">
+                <a16:creationId xmlns:a16="http://schemas.microsoft.com/office/drawing/2014/main" id="{A6E9ACB4-B2BA-B49A-1450-4860D0165C9B}"/>
               </a:ext>
             </a:extLst>
           </p:cNvPr>
           <p:cNvCxnSpPr>
             <a:cxnSpLocks/>
-            <a:stCxn id="5" idx="3"/>
+            <a:stCxn id="54" idx="3"/>
           </p:cNvCxnSpPr>
           <p:nvPr/>
         </p:nvCxnSpPr>
@@ -4270,16 +4389,16 @@
       </p:cxnSp>
       <p:cxnSp>
         <p:nvCxnSpPr>
-          <p:cNvPr id="20" name="Elbow Connector 19">
-            <a:extLst>
-              <a:ext uri="{FF2B5EF4-FFF2-40B4-BE49-F238E27FC236}">
-                <a16:creationId xmlns:a16="http://schemas.microsoft.com/office/drawing/2014/main" id="{5BDA5347-B9E0-B5E6-BD61-CF1C3469AB59}"/>
+          <p:cNvPr id="69" name="Elbow Connector 68">
+            <a:extLst>
+              <a:ext uri="{FF2B5EF4-FFF2-40B4-BE49-F238E27FC236}">
+                <a16:creationId xmlns:a16="http://schemas.microsoft.com/office/drawing/2014/main" id="{7127455F-6765-7BED-5511-5B6F16E2C355}"/>
               </a:ext>
             </a:extLst>
           </p:cNvPr>
           <p:cNvCxnSpPr>
             <a:cxnSpLocks/>
-            <a:endCxn id="11" idx="1"/>
+            <a:endCxn id="60" idx="1"/>
           </p:cNvCxnSpPr>
           <p:nvPr/>
         </p:nvCxnSpPr>
@@ -4317,10 +4436,10 @@
       </p:cxnSp>
       <p:sp>
         <p:nvSpPr>
-          <p:cNvPr id="21" name="직사각형 363">
-            <a:extLst>
-              <a:ext uri="{FF2B5EF4-FFF2-40B4-BE49-F238E27FC236}">
-                <a16:creationId xmlns:a16="http://schemas.microsoft.com/office/drawing/2014/main" id="{6754AC6C-95B5-C099-74E7-5C19F55B86C4}"/>
+          <p:cNvPr id="70" name="직사각형 363">
+            <a:extLst>
+              <a:ext uri="{FF2B5EF4-FFF2-40B4-BE49-F238E27FC236}">
+                <a16:creationId xmlns:a16="http://schemas.microsoft.com/office/drawing/2014/main" id="{F5C10ABD-095C-BA15-C063-8C5CC8A2BA25}"/>
               </a:ext>
             </a:extLst>
           </p:cNvPr>
@@ -4374,10 +4493,10 @@
       </p:sp>
       <p:sp>
         <p:nvSpPr>
-          <p:cNvPr id="22" name="직사각형 255">
-            <a:extLst>
-              <a:ext uri="{FF2B5EF4-FFF2-40B4-BE49-F238E27FC236}">
-                <a16:creationId xmlns:a16="http://schemas.microsoft.com/office/drawing/2014/main" id="{35DD3AC1-B77D-7B22-89C7-7CDEE8C04992}"/>
+          <p:cNvPr id="71" name="직사각형 255">
+            <a:extLst>
+              <a:ext uri="{FF2B5EF4-FFF2-40B4-BE49-F238E27FC236}">
+                <a16:creationId xmlns:a16="http://schemas.microsoft.com/office/drawing/2014/main" id="{4E200ACE-B67A-8E34-88D1-A3F4F426FDD2}"/>
               </a:ext>
             </a:extLst>
           </p:cNvPr>
@@ -4386,8 +4505,8 @@
         </p:nvSpPr>
         <p:spPr>
           <a:xfrm>
-            <a:off x="4112682" y="2592066"/>
-            <a:ext cx="702115" cy="123111"/>
+            <a:off x="4165581" y="2486268"/>
+            <a:ext cx="567463" cy="246221"/>
           </a:xfrm>
           <a:prstGeom prst="rect">
             <a:avLst/>
@@ -4403,7 +4522,15 @@
               <a:rPr lang="en-US" altLang="ko-KR" sz="800" dirty="0">
                 <a:latin typeface="Calibri" panose="020F0502020204030204" pitchFamily="34" charset="0"/>
               </a:rPr>
-              <a:t>(1) Login request</a:t>
+              <a:t>(1) (11) </a:t>
+            </a:r>
+          </a:p>
+          <a:p>
+            <a:r>
+              <a:rPr lang="en-US" altLang="ko-KR" sz="800" dirty="0">
+                <a:latin typeface="Calibri" panose="020F0502020204030204" pitchFamily="34" charset="0"/>
+              </a:rPr>
+              <a:t>Login request</a:t>
             </a:r>
             <a:endParaRPr lang="ko-KR" altLang="en-US" sz="800" dirty="0">
               <a:latin typeface="Calibri" panose="020F0502020204030204" pitchFamily="34" charset="0"/>
@@ -4413,10 +4540,10 @@
       </p:sp>
       <p:sp>
         <p:nvSpPr>
-          <p:cNvPr id="23" name="직사각형 255">
-            <a:extLst>
-              <a:ext uri="{FF2B5EF4-FFF2-40B4-BE49-F238E27FC236}">
-                <a16:creationId xmlns:a16="http://schemas.microsoft.com/office/drawing/2014/main" id="{04F66896-DEA1-25E6-14B5-31DA755143F2}"/>
+          <p:cNvPr id="72" name="직사각형 255">
+            <a:extLst>
+              <a:ext uri="{FF2B5EF4-FFF2-40B4-BE49-F238E27FC236}">
+                <a16:creationId xmlns:a16="http://schemas.microsoft.com/office/drawing/2014/main" id="{FF5AEADC-F7F6-9100-93BB-68DA2582E52E}"/>
               </a:ext>
             </a:extLst>
           </p:cNvPr>
@@ -4425,8 +4552,8 @@
         </p:nvSpPr>
         <p:spPr>
           <a:xfrm>
-            <a:off x="5284941" y="2924180"/>
-            <a:ext cx="679673" cy="123111"/>
+            <a:off x="5247156" y="2924180"/>
+            <a:ext cx="865622" cy="123111"/>
           </a:xfrm>
           <a:prstGeom prst="rect">
             <a:avLst/>
@@ -4442,7 +4569,7 @@
               <a:rPr lang="en-US" altLang="ko-KR" sz="800" dirty="0">
                 <a:latin typeface="Calibri" panose="020F0502020204030204" pitchFamily="34" charset="0"/>
               </a:rPr>
-              <a:t>(2) Auth request</a:t>
+              <a:t>(2) (12) Auth request</a:t>
             </a:r>
             <a:endParaRPr lang="ko-KR" altLang="en-US" sz="800" dirty="0">
               <a:latin typeface="Calibri" panose="020F0502020204030204" pitchFamily="34" charset="0"/>
@@ -4452,10 +4579,10 @@
       </p:sp>
       <p:pic>
         <p:nvPicPr>
-          <p:cNvPr id="24" name="Picture 23">
-            <a:extLst>
-              <a:ext uri="{FF2B5EF4-FFF2-40B4-BE49-F238E27FC236}">
-                <a16:creationId xmlns:a16="http://schemas.microsoft.com/office/drawing/2014/main" id="{D31B37E1-662E-C00D-48B4-6A3A80E5ED9B}"/>
+          <p:cNvPr id="73" name="Picture 72">
+            <a:extLst>
+              <a:ext uri="{FF2B5EF4-FFF2-40B4-BE49-F238E27FC236}">
+                <a16:creationId xmlns:a16="http://schemas.microsoft.com/office/drawing/2014/main" id="{EFA8AF47-E26D-8251-F7E3-51DB0B192DC4}"/>
               </a:ext>
             </a:extLst>
           </p:cNvPr>
@@ -4465,7 +4592,7 @@
           <p:nvPr/>
         </p:nvPicPr>
         <p:blipFill>
-          <a:blip r:embed="rId8"/>
+          <a:blip r:embed="rId9"/>
           <a:stretch>
             <a:fillRect/>
           </a:stretch>
@@ -4482,17 +4609,17 @@
       </p:pic>
       <p:cxnSp>
         <p:nvCxnSpPr>
-          <p:cNvPr id="25" name="Elbow Connector 24">
-            <a:extLst>
-              <a:ext uri="{FF2B5EF4-FFF2-40B4-BE49-F238E27FC236}">
-                <a16:creationId xmlns:a16="http://schemas.microsoft.com/office/drawing/2014/main" id="{0F63F8CC-8861-4F2C-3E5C-0449045D947F}"/>
+          <p:cNvPr id="74" name="Elbow Connector 73">
+            <a:extLst>
+              <a:ext uri="{FF2B5EF4-FFF2-40B4-BE49-F238E27FC236}">
+                <a16:creationId xmlns:a16="http://schemas.microsoft.com/office/drawing/2014/main" id="{76C31F66-8FA2-68A9-1CC8-F1EE9A51DBF9}"/>
               </a:ext>
             </a:extLst>
           </p:cNvPr>
           <p:cNvCxnSpPr>
             <a:cxnSpLocks/>
-            <a:stCxn id="14" idx="3"/>
-            <a:endCxn id="34" idx="1"/>
+            <a:stCxn id="63" idx="3"/>
+            <a:endCxn id="83" idx="1"/>
           </p:cNvCxnSpPr>
           <p:nvPr/>
         </p:nvCxnSpPr>
@@ -4531,10 +4658,10 @@
       </p:cxnSp>
       <p:sp>
         <p:nvSpPr>
-          <p:cNvPr id="26" name="직사각형 256">
-            <a:extLst>
-              <a:ext uri="{FF2B5EF4-FFF2-40B4-BE49-F238E27FC236}">
-                <a16:creationId xmlns:a16="http://schemas.microsoft.com/office/drawing/2014/main" id="{254EAAC5-AA79-2322-9D1E-8CB200ADCBF5}"/>
+          <p:cNvPr id="75" name="직사각형 256">
+            <a:extLst>
+              <a:ext uri="{FF2B5EF4-FFF2-40B4-BE49-F238E27FC236}">
+                <a16:creationId xmlns:a16="http://schemas.microsoft.com/office/drawing/2014/main" id="{3FF01F06-4A91-11BE-B521-0C8E96BE8874}"/>
               </a:ext>
             </a:extLst>
           </p:cNvPr>
@@ -4569,7 +4696,7 @@
                 </a:solidFill>
                 <a:latin typeface="Calibri" panose="020F0502020204030204" pitchFamily="34" charset="0"/>
               </a:rPr>
-              <a:t>(3) (11) NGINX Plus exchanges authorization code for ID / access token</a:t>
+              <a:t>(3) (13) NGINX Plus exchanges authorization code for ID / access token</a:t>
             </a:r>
             <a:endParaRPr lang="ko-KR" altLang="en-US" sz="800" dirty="0">
               <a:solidFill>
@@ -4582,16 +4709,16 @@
       </p:sp>
       <p:cxnSp>
         <p:nvCxnSpPr>
-          <p:cNvPr id="27" name="Elbow Connector 26">
-            <a:extLst>
-              <a:ext uri="{FF2B5EF4-FFF2-40B4-BE49-F238E27FC236}">
-                <a16:creationId xmlns:a16="http://schemas.microsoft.com/office/drawing/2014/main" id="{2A637397-741A-929F-F250-4C6821F7E2EA}"/>
+          <p:cNvPr id="76" name="Elbow Connector 75">
+            <a:extLst>
+              <a:ext uri="{FF2B5EF4-FFF2-40B4-BE49-F238E27FC236}">
+                <a16:creationId xmlns:a16="http://schemas.microsoft.com/office/drawing/2014/main" id="{28A511B1-79B2-A301-43CB-FA473A7C869B}"/>
               </a:ext>
             </a:extLst>
           </p:cNvPr>
           <p:cNvCxnSpPr>
             <a:cxnSpLocks/>
-            <a:stCxn id="2" idx="1"/>
+            <a:stCxn id="102" idx="1"/>
           </p:cNvCxnSpPr>
           <p:nvPr/>
         </p:nvCxnSpPr>
@@ -4629,10 +4756,10 @@
       </p:cxnSp>
       <p:sp>
         <p:nvSpPr>
-          <p:cNvPr id="28" name="직사각형 255">
-            <a:extLst>
-              <a:ext uri="{FF2B5EF4-FFF2-40B4-BE49-F238E27FC236}">
-                <a16:creationId xmlns:a16="http://schemas.microsoft.com/office/drawing/2014/main" id="{CA00FA19-A2A3-8045-4843-696C0837CC45}"/>
+          <p:cNvPr id="77" name="직사각형 255">
+            <a:extLst>
+              <a:ext uri="{FF2B5EF4-FFF2-40B4-BE49-F238E27FC236}">
+                <a16:creationId xmlns:a16="http://schemas.microsoft.com/office/drawing/2014/main" id="{43405FD5-D9F9-8895-7C13-1B8DAEAC8704}"/>
               </a:ext>
             </a:extLst>
           </p:cNvPr>
@@ -4641,8 +4768,8 @@
         </p:nvSpPr>
         <p:spPr>
           <a:xfrm>
-            <a:off x="4047124" y="2965122"/>
-            <a:ext cx="679991" cy="246221"/>
+            <a:off x="4047124" y="2859324"/>
+            <a:ext cx="679991" cy="369332"/>
           </a:xfrm>
           <a:prstGeom prst="rect">
             <a:avLst/>
@@ -4659,7 +4786,16 @@
               <a:rPr lang="en-US" altLang="ko-KR" sz="800" dirty="0">
                 <a:latin typeface="Calibri" panose="020F0502020204030204" pitchFamily="34" charset="0"/>
               </a:rPr>
-              <a:t>(4) Redirect to original URI</a:t>
+              <a:t>(4) (14) </a:t>
+            </a:r>
+          </a:p>
+          <a:p>
+            <a:pPr algn="r"/>
+            <a:r>
+              <a:rPr lang="en-US" altLang="ko-KR" sz="800" dirty="0">
+                <a:latin typeface="Calibri" panose="020F0502020204030204" pitchFamily="34" charset="0"/>
+              </a:rPr>
+              <a:t>Redirect to original URI</a:t>
             </a:r>
             <a:endParaRPr lang="ko-KR" altLang="en-US" sz="800" dirty="0">
               <a:latin typeface="Calibri" panose="020F0502020204030204" pitchFamily="34" charset="0"/>
@@ -4669,16 +4805,16 @@
       </p:sp>
       <p:cxnSp>
         <p:nvCxnSpPr>
-          <p:cNvPr id="29" name="Straight Arrow Connector 28">
-            <a:extLst>
-              <a:ext uri="{FF2B5EF4-FFF2-40B4-BE49-F238E27FC236}">
-                <a16:creationId xmlns:a16="http://schemas.microsoft.com/office/drawing/2014/main" id="{2AB74855-D3F4-B969-80EC-A9B42C2300BF}"/>
+          <p:cNvPr id="78" name="Straight Arrow Connector 77">
+            <a:extLst>
+              <a:ext uri="{FF2B5EF4-FFF2-40B4-BE49-F238E27FC236}">
+                <a16:creationId xmlns:a16="http://schemas.microsoft.com/office/drawing/2014/main" id="{A6F0E06D-5799-4F69-A82B-2E9D896809F9}"/>
               </a:ext>
             </a:extLst>
           </p:cNvPr>
           <p:cNvCxnSpPr>
             <a:cxnSpLocks/>
-            <a:endCxn id="15" idx="1"/>
+            <a:endCxn id="64" idx="1"/>
           </p:cNvCxnSpPr>
           <p:nvPr/>
         </p:nvCxnSpPr>
@@ -4717,17 +4853,17 @@
       </p:cxnSp>
       <p:cxnSp>
         <p:nvCxnSpPr>
-          <p:cNvPr id="30" name="Elbow Connector 29">
-            <a:extLst>
-              <a:ext uri="{FF2B5EF4-FFF2-40B4-BE49-F238E27FC236}">
-                <a16:creationId xmlns:a16="http://schemas.microsoft.com/office/drawing/2014/main" id="{27CBF734-C263-CBE5-6DE1-AD2E087CE103}"/>
+          <p:cNvPr id="79" name="Elbow Connector 78">
+            <a:extLst>
+              <a:ext uri="{FF2B5EF4-FFF2-40B4-BE49-F238E27FC236}">
+                <a16:creationId xmlns:a16="http://schemas.microsoft.com/office/drawing/2014/main" id="{17CB66A7-1EC6-E7E2-AAC4-3D48E49CC734}"/>
               </a:ext>
             </a:extLst>
           </p:cNvPr>
           <p:cNvCxnSpPr>
             <a:cxnSpLocks/>
-            <a:stCxn id="15" idx="3"/>
-            <a:endCxn id="33" idx="1"/>
+            <a:stCxn id="64" idx="3"/>
+            <a:endCxn id="82" idx="1"/>
           </p:cNvCxnSpPr>
           <p:nvPr/>
         </p:nvCxnSpPr>
@@ -4766,10 +4902,10 @@
       </p:cxnSp>
       <p:sp>
         <p:nvSpPr>
-          <p:cNvPr id="31" name="직사각형 255">
-            <a:extLst>
-              <a:ext uri="{FF2B5EF4-FFF2-40B4-BE49-F238E27FC236}">
-                <a16:creationId xmlns:a16="http://schemas.microsoft.com/office/drawing/2014/main" id="{D41DCA3A-0AC0-0106-853E-3C687E809B0C}"/>
+          <p:cNvPr id="80" name="직사각형 255">
+            <a:extLst>
+              <a:ext uri="{FF2B5EF4-FFF2-40B4-BE49-F238E27FC236}">
+                <a16:creationId xmlns:a16="http://schemas.microsoft.com/office/drawing/2014/main" id="{C4536866-F493-111A-4FBE-971FD8330BA5}"/>
               </a:ext>
             </a:extLst>
           </p:cNvPr>
@@ -4778,8 +4914,8 @@
         </p:nvSpPr>
         <p:spPr>
           <a:xfrm>
-            <a:off x="4165016" y="3559244"/>
-            <a:ext cx="654968" cy="369332"/>
+            <a:off x="4165016" y="3453446"/>
+            <a:ext cx="654968" cy="492443"/>
           </a:xfrm>
           <a:prstGeom prst="rect">
             <a:avLst/>
@@ -4796,7 +4932,7 @@
               <a:rPr lang="en-US" altLang="ko-KR" sz="800" dirty="0">
                 <a:latin typeface="Calibri" panose="020F0502020204030204" pitchFamily="34" charset="0"/>
               </a:rPr>
-              <a:t>(5) Request /response</a:t>
+              <a:t>(5) (15) Request /response</a:t>
             </a:r>
           </a:p>
           <a:p>
@@ -4815,10 +4951,10 @@
       </p:sp>
       <p:sp>
         <p:nvSpPr>
-          <p:cNvPr id="32" name="직사각형 255">
-            <a:extLst>
-              <a:ext uri="{FF2B5EF4-FFF2-40B4-BE49-F238E27FC236}">
-                <a16:creationId xmlns:a16="http://schemas.microsoft.com/office/drawing/2014/main" id="{26E245C4-5A61-C9D0-805A-1C7F926B8298}"/>
+          <p:cNvPr id="81" name="직사각형 255">
+            <a:extLst>
+              <a:ext uri="{FF2B5EF4-FFF2-40B4-BE49-F238E27FC236}">
+                <a16:creationId xmlns:a16="http://schemas.microsoft.com/office/drawing/2014/main" id="{0EFCB3B4-6139-7D39-97E2-63B84B3199B8}"/>
               </a:ext>
             </a:extLst>
           </p:cNvPr>
@@ -4827,8 +4963,8 @@
         </p:nvSpPr>
         <p:spPr>
           <a:xfrm>
-            <a:off x="6219296" y="3299993"/>
-            <a:ext cx="580527" cy="369332"/>
+            <a:off x="6219296" y="3428462"/>
+            <a:ext cx="580527" cy="492443"/>
           </a:xfrm>
           <a:prstGeom prst="rect">
             <a:avLst/>
@@ -4845,7 +4981,7 @@
               <a:rPr lang="en-US" altLang="ko-KR" sz="800" dirty="0">
                 <a:latin typeface="Calibri" panose="020F0502020204030204" pitchFamily="34" charset="0"/>
               </a:rPr>
-              <a:t>(6) Request /response</a:t>
+              <a:t>(6) (16) Request /response</a:t>
             </a:r>
           </a:p>
           <a:p>
@@ -4864,10 +5000,10 @@
       </p:sp>
       <p:sp>
         <p:nvSpPr>
-          <p:cNvPr id="33" name="직사각형 363">
-            <a:extLst>
-              <a:ext uri="{FF2B5EF4-FFF2-40B4-BE49-F238E27FC236}">
-                <a16:creationId xmlns:a16="http://schemas.microsoft.com/office/drawing/2014/main" id="{A4F029A2-B441-5FA7-7EE3-2BA276C02DC7}"/>
+          <p:cNvPr id="82" name="직사각형 363">
+            <a:extLst>
+              <a:ext uri="{FF2B5EF4-FFF2-40B4-BE49-F238E27FC236}">
+                <a16:creationId xmlns:a16="http://schemas.microsoft.com/office/drawing/2014/main" id="{6E88015F-34A1-883A-BDCE-264E52B63B3E}"/>
               </a:ext>
             </a:extLst>
           </p:cNvPr>
@@ -4921,10 +5057,10 @@
       </p:sp>
       <p:sp>
         <p:nvSpPr>
-          <p:cNvPr id="34" name="직사각형 363">
-            <a:extLst>
-              <a:ext uri="{FF2B5EF4-FFF2-40B4-BE49-F238E27FC236}">
-                <a16:creationId xmlns:a16="http://schemas.microsoft.com/office/drawing/2014/main" id="{A4A82DC9-BCB2-A802-2F4D-00BC9645A1CF}"/>
+          <p:cNvPr id="83" name="직사각형 363">
+            <a:extLst>
+              <a:ext uri="{FF2B5EF4-FFF2-40B4-BE49-F238E27FC236}">
+                <a16:creationId xmlns:a16="http://schemas.microsoft.com/office/drawing/2014/main" id="{B9766995-0F9A-DF0E-9729-B93BB6E219F1}"/>
               </a:ext>
             </a:extLst>
           </p:cNvPr>
@@ -4978,27 +5114,26 @@
       </p:sp>
       <p:cxnSp>
         <p:nvCxnSpPr>
-          <p:cNvPr id="35" name="Elbow Connector 34">
-            <a:extLst>
-              <a:ext uri="{FF2B5EF4-FFF2-40B4-BE49-F238E27FC236}">
-                <a16:creationId xmlns:a16="http://schemas.microsoft.com/office/drawing/2014/main" id="{95A2C780-81AC-DE81-0D3D-35EEB56018D5}"/>
+          <p:cNvPr id="84" name="Elbow Connector 83">
+            <a:extLst>
+              <a:ext uri="{FF2B5EF4-FFF2-40B4-BE49-F238E27FC236}">
+                <a16:creationId xmlns:a16="http://schemas.microsoft.com/office/drawing/2014/main" id="{E93D53B4-DEB4-CF63-A54C-C747FEB78056}"/>
               </a:ext>
             </a:extLst>
           </p:cNvPr>
           <p:cNvCxnSpPr>
             <a:cxnSpLocks/>
+            <a:endCxn id="85" idx="0"/>
           </p:cNvCxnSpPr>
           <p:nvPr/>
         </p:nvCxnSpPr>
         <p:spPr>
           <a:xfrm>
-            <a:off x="3925732" y="4065264"/>
-            <a:ext cx="1049997" cy="239643"/>
-          </a:xfrm>
-          <a:prstGeom prst="bentConnector3">
-            <a:avLst>
-              <a:gd name="adj1" fmla="val 32321"/>
-            </a:avLst>
+            <a:off x="3914828" y="4041111"/>
+            <a:ext cx="1614637" cy="80691"/>
+          </a:xfrm>
+          <a:prstGeom prst="bentConnector2">
+            <a:avLst/>
           </a:prstGeom>
           <a:ln>
             <a:solidFill>
@@ -5024,10 +5159,10 @@
       </p:cxnSp>
       <p:sp>
         <p:nvSpPr>
-          <p:cNvPr id="36" name="Diamond 35">
-            <a:extLst>
-              <a:ext uri="{FF2B5EF4-FFF2-40B4-BE49-F238E27FC236}">
-                <a16:creationId xmlns:a16="http://schemas.microsoft.com/office/drawing/2014/main" id="{6A02A185-A301-729D-38D8-E4A236276914}"/>
+          <p:cNvPr id="85" name="Diamond 84">
+            <a:extLst>
+              <a:ext uri="{FF2B5EF4-FFF2-40B4-BE49-F238E27FC236}">
+                <a16:creationId xmlns:a16="http://schemas.microsoft.com/office/drawing/2014/main" id="{2D38966F-5DFA-CB60-5EA1-6088AE8D0442}"/>
               </a:ext>
             </a:extLst>
           </p:cNvPr>
@@ -5081,28 +5216,27 @@
       </p:sp>
       <p:cxnSp>
         <p:nvCxnSpPr>
-          <p:cNvPr id="37" name="Elbow Connector 36">
-            <a:extLst>
-              <a:ext uri="{FF2B5EF4-FFF2-40B4-BE49-F238E27FC236}">
-                <a16:creationId xmlns:a16="http://schemas.microsoft.com/office/drawing/2014/main" id="{9FC48667-2617-168E-8ED7-F1E1BE7D15A6}"/>
+          <p:cNvPr id="86" name="Elbow Connector 85">
+            <a:extLst>
+              <a:ext uri="{FF2B5EF4-FFF2-40B4-BE49-F238E27FC236}">
+                <a16:creationId xmlns:a16="http://schemas.microsoft.com/office/drawing/2014/main" id="{E8772AD6-AB34-7F8A-747E-3C92C68BA5D5}"/>
               </a:ext>
             </a:extLst>
           </p:cNvPr>
           <p:cNvCxnSpPr>
             <a:cxnSpLocks/>
-            <a:stCxn id="36" idx="0"/>
+            <a:stCxn id="97" idx="1"/>
+            <a:endCxn id="104" idx="2"/>
           </p:cNvCxnSpPr>
           <p:nvPr/>
         </p:nvCxnSpPr>
         <p:spPr>
-          <a:xfrm rot="5400000" flipH="1" flipV="1">
-            <a:off x="5389937" y="3530516"/>
-            <a:ext cx="730815" cy="451759"/>
-          </a:xfrm>
-          <a:prstGeom prst="bentConnector3">
-            <a:avLst>
-              <a:gd name="adj1" fmla="val 21778"/>
-            </a:avLst>
+          <a:xfrm rot="10800000">
+            <a:off x="3804447" y="3718073"/>
+            <a:ext cx="1171283" cy="586834"/>
+          </a:xfrm>
+          <a:prstGeom prst="bentConnector2">
+            <a:avLst/>
           </a:prstGeom>
           <a:ln>
             <a:solidFill>
@@ -5128,10 +5262,10 @@
       </p:cxnSp>
       <p:sp>
         <p:nvSpPr>
-          <p:cNvPr id="38" name="직사각형 255">
-            <a:extLst>
-              <a:ext uri="{FF2B5EF4-FFF2-40B4-BE49-F238E27FC236}">
-                <a16:creationId xmlns:a16="http://schemas.microsoft.com/office/drawing/2014/main" id="{E312866B-D84A-4867-B3A6-9400B625FC0C}"/>
+          <p:cNvPr id="87" name="직사각형 255">
+            <a:extLst>
+              <a:ext uri="{FF2B5EF4-FFF2-40B4-BE49-F238E27FC236}">
+                <a16:creationId xmlns:a16="http://schemas.microsoft.com/office/drawing/2014/main" id="{AA1670CA-E648-3852-0BB1-E77CD7644BA9}"/>
               </a:ext>
             </a:extLst>
           </p:cNvPr>
@@ -5140,8 +5274,8 @@
         </p:nvSpPr>
         <p:spPr>
           <a:xfrm>
-            <a:off x="4247017" y="4143052"/>
-            <a:ext cx="580527" cy="123111"/>
+            <a:off x="4074515" y="4037254"/>
+            <a:ext cx="753029" cy="123111"/>
           </a:xfrm>
           <a:prstGeom prst="rect">
             <a:avLst/>
@@ -5158,7 +5292,7 @@
               <a:rPr lang="en-US" altLang="ko-KR" sz="800" dirty="0">
                 <a:latin typeface="Calibri" panose="020F0502020204030204" pitchFamily="34" charset="0"/>
               </a:rPr>
-              <a:t>(7) Call APIs</a:t>
+              <a:t>(7) (17) Call APIs</a:t>
             </a:r>
             <a:endParaRPr lang="ko-KR" altLang="en-US" sz="800" dirty="0">
               <a:latin typeface="Calibri" panose="020F0502020204030204" pitchFamily="34" charset="0"/>
@@ -5168,16 +5302,16 @@
       </p:sp>
       <p:cxnSp>
         <p:nvCxnSpPr>
-          <p:cNvPr id="39" name="Elbow Connector 38">
-            <a:extLst>
-              <a:ext uri="{FF2B5EF4-FFF2-40B4-BE49-F238E27FC236}">
-                <a16:creationId xmlns:a16="http://schemas.microsoft.com/office/drawing/2014/main" id="{EDB20CE9-60EF-C6FB-4780-EC92B28701CC}"/>
+          <p:cNvPr id="88" name="Elbow Connector 87">
+            <a:extLst>
+              <a:ext uri="{FF2B5EF4-FFF2-40B4-BE49-F238E27FC236}">
+                <a16:creationId xmlns:a16="http://schemas.microsoft.com/office/drawing/2014/main" id="{104999E6-D5B0-7175-A137-C42599326773}"/>
               </a:ext>
             </a:extLst>
           </p:cNvPr>
           <p:cNvCxnSpPr>
             <a:cxnSpLocks/>
-            <a:endCxn id="12" idx="1"/>
+            <a:endCxn id="61" idx="1"/>
           </p:cNvCxnSpPr>
           <p:nvPr/>
         </p:nvCxnSpPr>
@@ -5215,10 +5349,10 @@
       </p:cxnSp>
       <p:sp>
         <p:nvSpPr>
-          <p:cNvPr id="40" name="직사각형 255">
-            <a:extLst>
-              <a:ext uri="{FF2B5EF4-FFF2-40B4-BE49-F238E27FC236}">
-                <a16:creationId xmlns:a16="http://schemas.microsoft.com/office/drawing/2014/main" id="{14E13C10-413D-4DEC-138E-CF6B4084E6BD}"/>
+          <p:cNvPr id="89" name="직사각형 255">
+            <a:extLst>
+              <a:ext uri="{FF2B5EF4-FFF2-40B4-BE49-F238E27FC236}">
+                <a16:creationId xmlns:a16="http://schemas.microsoft.com/office/drawing/2014/main" id="{ADF5044E-67E2-007D-6122-BA426DBE804A}"/>
               </a:ext>
             </a:extLst>
           </p:cNvPr>
@@ -5227,7 +5361,7 @@
         </p:nvSpPr>
         <p:spPr>
           <a:xfrm>
-            <a:off x="4935642" y="3949143"/>
+            <a:off x="4269915" y="4312760"/>
             <a:ext cx="580527" cy="123111"/>
           </a:xfrm>
           <a:prstGeom prst="rect">
@@ -5255,17 +5389,17 @@
       </p:sp>
       <p:cxnSp>
         <p:nvCxnSpPr>
-          <p:cNvPr id="41" name="Elbow Connector 40">
-            <a:extLst>
-              <a:ext uri="{FF2B5EF4-FFF2-40B4-BE49-F238E27FC236}">
-                <a16:creationId xmlns:a16="http://schemas.microsoft.com/office/drawing/2014/main" id="{96274688-B225-77F2-D2FB-4FDA459F473B}"/>
+          <p:cNvPr id="90" name="Elbow Connector 89">
+            <a:extLst>
+              <a:ext uri="{FF2B5EF4-FFF2-40B4-BE49-F238E27FC236}">
+                <a16:creationId xmlns:a16="http://schemas.microsoft.com/office/drawing/2014/main" id="{B2A9DA21-2492-FC3B-BE0B-4EE8BE20BFD5}"/>
               </a:ext>
             </a:extLst>
           </p:cNvPr>
           <p:cNvCxnSpPr>
             <a:cxnSpLocks/>
-            <a:stCxn id="48" idx="3"/>
-            <a:endCxn id="21" idx="1"/>
+            <a:stCxn id="97" idx="3"/>
+            <a:endCxn id="70" idx="1"/>
           </p:cNvCxnSpPr>
           <p:nvPr/>
         </p:nvCxnSpPr>
@@ -5303,10 +5437,10 @@
       </p:cxnSp>
       <p:sp>
         <p:nvSpPr>
-          <p:cNvPr id="42" name="직사각형 255">
-            <a:extLst>
-              <a:ext uri="{FF2B5EF4-FFF2-40B4-BE49-F238E27FC236}">
-                <a16:creationId xmlns:a16="http://schemas.microsoft.com/office/drawing/2014/main" id="{AAA3968A-BE59-06FA-FC2A-9D7BD3C369BA}"/>
+          <p:cNvPr id="91" name="직사각형 255">
+            <a:extLst>
+              <a:ext uri="{FF2B5EF4-FFF2-40B4-BE49-F238E27FC236}">
+                <a16:creationId xmlns:a16="http://schemas.microsoft.com/office/drawing/2014/main" id="{3F8D770B-4218-D6A7-2688-1C77D3390392}"/>
               </a:ext>
             </a:extLst>
           </p:cNvPr>
@@ -5315,8 +5449,8 @@
         </p:nvSpPr>
         <p:spPr>
           <a:xfrm>
-            <a:off x="6395896" y="3894079"/>
-            <a:ext cx="580527" cy="246221"/>
+            <a:off x="6104934" y="3946978"/>
+            <a:ext cx="901718" cy="246221"/>
           </a:xfrm>
           <a:prstGeom prst="rect">
             <a:avLst/>
@@ -5333,7 +5467,7 @@
               <a:rPr lang="en-US" altLang="ko-KR" sz="800" dirty="0">
                 <a:latin typeface="Calibri" panose="020F0502020204030204" pitchFamily="34" charset="0"/>
               </a:rPr>
-              <a:t>(8) Token validation</a:t>
+              <a:t>(8) (18) Token validation</a:t>
             </a:r>
             <a:endParaRPr lang="ko-KR" altLang="en-US" sz="800" dirty="0">
               <a:latin typeface="Calibri" panose="020F0502020204030204" pitchFamily="34" charset="0"/>
@@ -5343,16 +5477,16 @@
       </p:sp>
       <p:cxnSp>
         <p:nvCxnSpPr>
-          <p:cNvPr id="43" name="Elbow Connector 42">
-            <a:extLst>
-              <a:ext uri="{FF2B5EF4-FFF2-40B4-BE49-F238E27FC236}">
-                <a16:creationId xmlns:a16="http://schemas.microsoft.com/office/drawing/2014/main" id="{467B6D70-986D-C954-7B18-C86CAE1349CF}"/>
+          <p:cNvPr id="92" name="Elbow Connector 91">
+            <a:extLst>
+              <a:ext uri="{FF2B5EF4-FFF2-40B4-BE49-F238E27FC236}">
+                <a16:creationId xmlns:a16="http://schemas.microsoft.com/office/drawing/2014/main" id="{B33F6577-DFC3-830C-62CD-866AFCD41B08}"/>
               </a:ext>
             </a:extLst>
           </p:cNvPr>
           <p:cNvCxnSpPr>
             <a:cxnSpLocks/>
-            <a:endCxn id="16" idx="1"/>
+            <a:endCxn id="65" idx="1"/>
           </p:cNvCxnSpPr>
           <p:nvPr/>
         </p:nvCxnSpPr>
@@ -5390,10 +5524,10 @@
       </p:cxnSp>
       <p:sp>
         <p:nvSpPr>
-          <p:cNvPr id="44" name="직사각형 255">
-            <a:extLst>
-              <a:ext uri="{FF2B5EF4-FFF2-40B4-BE49-F238E27FC236}">
-                <a16:creationId xmlns:a16="http://schemas.microsoft.com/office/drawing/2014/main" id="{DF079112-3DAB-5A56-7458-CF3E79B09EFC}"/>
+          <p:cNvPr id="93" name="직사각형 255">
+            <a:extLst>
+              <a:ext uri="{FF2B5EF4-FFF2-40B4-BE49-F238E27FC236}">
+                <a16:creationId xmlns:a16="http://schemas.microsoft.com/office/drawing/2014/main" id="{26E984A7-3F77-F7AD-2485-A7866AA5CB29}"/>
               </a:ext>
             </a:extLst>
           </p:cNvPr>
@@ -5420,7 +5554,7 @@
               <a:rPr lang="en-US" altLang="ko-KR" sz="800" dirty="0">
                 <a:latin typeface="Calibri" panose="020F0502020204030204" pitchFamily="34" charset="0"/>
               </a:rPr>
-              <a:t>(12) Logout request</a:t>
+              <a:t>(20) Logout request</a:t>
             </a:r>
             <a:endParaRPr lang="ko-KR" altLang="en-US" sz="800" dirty="0">
               <a:latin typeface="Calibri" panose="020F0502020204030204" pitchFamily="34" charset="0"/>
@@ -5430,17 +5564,17 @@
       </p:sp>
       <p:cxnSp>
         <p:nvCxnSpPr>
-          <p:cNvPr id="45" name="Elbow Connector 44">
-            <a:extLst>
-              <a:ext uri="{FF2B5EF4-FFF2-40B4-BE49-F238E27FC236}">
-                <a16:creationId xmlns:a16="http://schemas.microsoft.com/office/drawing/2014/main" id="{A382FDFA-B83E-FBBB-B7C9-EF32202A635E}"/>
+          <p:cNvPr id="94" name="Elbow Connector 93">
+            <a:extLst>
+              <a:ext uri="{FF2B5EF4-FFF2-40B4-BE49-F238E27FC236}">
+                <a16:creationId xmlns:a16="http://schemas.microsoft.com/office/drawing/2014/main" id="{509943FF-1A64-91F2-BB4C-835BB51FAE1C}"/>
               </a:ext>
             </a:extLst>
           </p:cNvPr>
           <p:cNvCxnSpPr>
             <a:cxnSpLocks/>
-            <a:stCxn id="47" idx="3"/>
-            <a:endCxn id="46" idx="1"/>
+            <a:stCxn id="96" idx="3"/>
+            <a:endCxn id="95" idx="1"/>
           </p:cNvCxnSpPr>
           <p:nvPr/>
         </p:nvCxnSpPr>
@@ -5478,10 +5612,10 @@
       </p:cxnSp>
       <p:sp>
         <p:nvSpPr>
-          <p:cNvPr id="46" name="직사각형 363">
-            <a:extLst>
-              <a:ext uri="{FF2B5EF4-FFF2-40B4-BE49-F238E27FC236}">
-                <a16:creationId xmlns:a16="http://schemas.microsoft.com/office/drawing/2014/main" id="{10A3FA56-2F23-C55F-B710-E5F819CC18F7}"/>
+          <p:cNvPr id="95" name="직사각형 363">
+            <a:extLst>
+              <a:ext uri="{FF2B5EF4-FFF2-40B4-BE49-F238E27FC236}">
+                <a16:creationId xmlns:a16="http://schemas.microsoft.com/office/drawing/2014/main" id="{5B7574D1-4E53-783D-A565-4DDAF2F39B22}"/>
               </a:ext>
             </a:extLst>
           </p:cNvPr>
@@ -5535,10 +5669,10 @@
       </p:sp>
       <p:sp>
         <p:nvSpPr>
-          <p:cNvPr id="47" name="직사각형 363">
-            <a:extLst>
-              <a:ext uri="{FF2B5EF4-FFF2-40B4-BE49-F238E27FC236}">
-                <a16:creationId xmlns:a16="http://schemas.microsoft.com/office/drawing/2014/main" id="{1F01EA7D-7716-25B0-830B-0A36447D6572}"/>
+          <p:cNvPr id="96" name="직사각형 363">
+            <a:extLst>
+              <a:ext uri="{FF2B5EF4-FFF2-40B4-BE49-F238E27FC236}">
+                <a16:creationId xmlns:a16="http://schemas.microsoft.com/office/drawing/2014/main" id="{968A3ACE-6A64-6113-B9A1-5C34F7C80D0A}"/>
               </a:ext>
             </a:extLst>
           </p:cNvPr>
@@ -5592,10 +5726,10 @@
       </p:sp>
       <p:sp>
         <p:nvSpPr>
-          <p:cNvPr id="48" name="TextBox 47">
-            <a:extLst>
-              <a:ext uri="{FF2B5EF4-FFF2-40B4-BE49-F238E27FC236}">
-                <a16:creationId xmlns:a16="http://schemas.microsoft.com/office/drawing/2014/main" id="{5F83CD93-B086-67F9-47AD-4F01063D53A0}"/>
+          <p:cNvPr id="97" name="TextBox 96">
+            <a:extLst>
+              <a:ext uri="{FF2B5EF4-FFF2-40B4-BE49-F238E27FC236}">
+                <a16:creationId xmlns:a16="http://schemas.microsoft.com/office/drawing/2014/main" id="{2813904D-6227-56A3-9F03-022A3A324BC1}"/>
               </a:ext>
             </a:extLst>
           </p:cNvPr>
@@ -5655,10 +5789,10 @@
       </p:sp>
       <p:sp>
         <p:nvSpPr>
-          <p:cNvPr id="49" name="직사각형 255">
-            <a:extLst>
-              <a:ext uri="{FF2B5EF4-FFF2-40B4-BE49-F238E27FC236}">
-                <a16:creationId xmlns:a16="http://schemas.microsoft.com/office/drawing/2014/main" id="{8F16281C-0CB2-C615-BD9E-1D05AD370C37}"/>
+          <p:cNvPr id="98" name="직사각형 255">
+            <a:extLst>
+              <a:ext uri="{FF2B5EF4-FFF2-40B4-BE49-F238E27FC236}">
+                <a16:creationId xmlns:a16="http://schemas.microsoft.com/office/drawing/2014/main" id="{61268621-839C-C8D9-AD1E-EF36100A3D21}"/>
               </a:ext>
             </a:extLst>
           </p:cNvPr>
@@ -5668,7 +5802,7 @@
         <p:spPr>
           <a:xfrm>
             <a:off x="6092773" y="4328647"/>
-            <a:ext cx="580527" cy="123111"/>
+            <a:ext cx="580527" cy="246221"/>
           </a:xfrm>
           <a:prstGeom prst="rect">
             <a:avLst/>
@@ -5685,7 +5819,16 @@
               <a:rPr lang="en-US" altLang="ko-KR" sz="800" dirty="0">
                 <a:latin typeface="Calibri" panose="020F0502020204030204" pitchFamily="34" charset="0"/>
               </a:rPr>
-              <a:t>(9) valid?</a:t>
+              <a:t>(9) (19) </a:t>
+            </a:r>
+          </a:p>
+          <a:p>
+            <a:pPr algn="r"/>
+            <a:r>
+              <a:rPr lang="en-US" altLang="ko-KR" sz="800" dirty="0">
+                <a:latin typeface="Calibri" panose="020F0502020204030204" pitchFamily="34" charset="0"/>
+              </a:rPr>
+              <a:t>valid?</a:t>
             </a:r>
             <a:endParaRPr lang="ko-KR" altLang="en-US" sz="800" dirty="0">
               <a:latin typeface="Calibri" panose="020F0502020204030204" pitchFamily="34" charset="0"/>
@@ -5695,17 +5838,17 @@
       </p:sp>
       <p:cxnSp>
         <p:nvCxnSpPr>
-          <p:cNvPr id="50" name="Elbow Connector 49">
-            <a:extLst>
-              <a:ext uri="{FF2B5EF4-FFF2-40B4-BE49-F238E27FC236}">
-                <a16:creationId xmlns:a16="http://schemas.microsoft.com/office/drawing/2014/main" id="{A850B1D6-8AA0-60EB-9E11-DBB36D23CA59}"/>
+          <p:cNvPr id="99" name="Elbow Connector 98">
+            <a:extLst>
+              <a:ext uri="{FF2B5EF4-FFF2-40B4-BE49-F238E27FC236}">
+                <a16:creationId xmlns:a16="http://schemas.microsoft.com/office/drawing/2014/main" id="{622AA135-FF2F-27EF-D1E1-E0D5DA5B943D}"/>
               </a:ext>
             </a:extLst>
           </p:cNvPr>
           <p:cNvCxnSpPr>
             <a:cxnSpLocks/>
-            <a:stCxn id="16" idx="2"/>
-            <a:endCxn id="52" idx="3"/>
+            <a:stCxn id="65" idx="2"/>
+            <a:endCxn id="101" idx="3"/>
           </p:cNvCxnSpPr>
           <p:nvPr/>
         </p:nvCxnSpPr>
@@ -5744,10 +5887,10 @@
       </p:cxnSp>
       <p:sp>
         <p:nvSpPr>
-          <p:cNvPr id="51" name="직사각형 255">
-            <a:extLst>
-              <a:ext uri="{FF2B5EF4-FFF2-40B4-BE49-F238E27FC236}">
-                <a16:creationId xmlns:a16="http://schemas.microsoft.com/office/drawing/2014/main" id="{D1F90B5B-2203-A3B0-A251-D24CD90A8230}"/>
+          <p:cNvPr id="100" name="직사각형 255">
+            <a:extLst>
+              <a:ext uri="{FF2B5EF4-FFF2-40B4-BE49-F238E27FC236}">
+                <a16:creationId xmlns:a16="http://schemas.microsoft.com/office/drawing/2014/main" id="{7E7BAB5F-F5C6-4744-1124-323955CF5714}"/>
               </a:ext>
             </a:extLst>
           </p:cNvPr>
@@ -5774,7 +5917,7 @@
               <a:rPr lang="en-US" altLang="ko-KR" sz="800" dirty="0">
                 <a:latin typeface="Calibri" panose="020F0502020204030204" pitchFamily="34" charset="0"/>
               </a:rPr>
-              <a:t>(13) Logout</a:t>
+              <a:t>(21) Logout</a:t>
             </a:r>
             <a:endParaRPr lang="ko-KR" altLang="en-US" sz="800" dirty="0">
               <a:latin typeface="Calibri" panose="020F0502020204030204" pitchFamily="34" charset="0"/>
@@ -5784,10 +5927,10 @@
       </p:sp>
       <p:sp>
         <p:nvSpPr>
-          <p:cNvPr id="52" name="직사각형 363">
-            <a:extLst>
-              <a:ext uri="{FF2B5EF4-FFF2-40B4-BE49-F238E27FC236}">
-                <a16:creationId xmlns:a16="http://schemas.microsoft.com/office/drawing/2014/main" id="{1BCDF503-45AA-5C35-D32B-414BD515FB88}"/>
+          <p:cNvPr id="102" name="직사각형 363">
+            <a:extLst>
+              <a:ext uri="{FF2B5EF4-FFF2-40B4-BE49-F238E27FC236}">
+                <a16:creationId xmlns:a16="http://schemas.microsoft.com/office/drawing/2014/main" id="{5A73E75C-C4F4-0960-75BE-A2A9764F643E}"/>
               </a:ext>
             </a:extLst>
           </p:cNvPr>
@@ -5796,117 +5939,55 @@
         </p:nvSpPr>
         <p:spPr>
           <a:xfrm>
-            <a:off x="7238521" y="1369379"/>
-            <a:ext cx="1309937" cy="1244245"/>
+            <a:off x="4974332" y="2801316"/>
+            <a:ext cx="45719" cy="61556"/>
           </a:xfrm>
           <a:prstGeom prst="rect">
             <a:avLst/>
           </a:prstGeom>
           <a:solidFill>
-            <a:schemeClr val="bg1"/>
+            <a:schemeClr val="accent6">
+              <a:lumMod val="20000"/>
+              <a:lumOff val="80000"/>
+            </a:schemeClr>
           </a:solidFill>
           <a:ln w="3175" cap="flat" cmpd="sng" algn="ctr">
             <a:solidFill>
-              <a:schemeClr val="bg1">
-                <a:lumMod val="75000"/>
+              <a:schemeClr val="accent6">
+                <a:lumMod val="20000"/>
+                <a:lumOff val="80000"/>
               </a:schemeClr>
             </a:solidFill>
-            <a:prstDash val="dash"/>
+            <a:prstDash val="solid"/>
             <a:miter lim="800000"/>
           </a:ln>
           <a:effectLst/>
         </p:spPr>
         <p:txBody>
-          <a:bodyPr lIns="0" rIns="0" rtlCol="0" anchor="t" anchorCtr="0"/>
-          <a:lstStyle/>
-          <a:p>
-            <a:pPr marL="0" marR="0" lvl="0" indent="0" algn="ctr" defTabSz="914400" eaLnBrk="1" fontAlgn="auto" latinLnBrk="0" hangingPunct="1">
+          <a:bodyPr rtlCol="0" anchor="ctr"/>
+          <a:lstStyle/>
+          <a:p>
+            <a:pPr algn="ctr">
               <a:lnSpc>
-                <a:spcPct val="100000"/>
+                <a:spcPct val="80000"/>
               </a:lnSpc>
-              <a:spcBef>
-                <a:spcPts val="0"/>
-              </a:spcBef>
-              <a:spcAft>
-                <a:spcPts val="0"/>
-              </a:spcAft>
-              <a:buClrTx/>
-              <a:buSzTx/>
-              <a:buFontTx/>
-              <a:buNone/>
-              <a:tabLst/>
-              <a:defRPr/>
             </a:pPr>
-            <a:r>
-              <a:rPr kumimoji="0" lang="en-US" altLang="ko-KR" sz="1200" b="1" i="0" u="none" strike="noStrike" kern="0" cap="none" spc="0" normalizeH="0" baseline="0" noProof="0" dirty="0">
-                <a:ln>
-                  <a:noFill/>
-                </a:ln>
-                <a:solidFill>
-                  <a:prstClr val="black"/>
-                </a:solidFill>
-                <a:effectLst/>
-                <a:uLnTx/>
-                <a:uFillTx/>
-                <a:latin typeface="Calibri" panose="020F0502020204030204" pitchFamily="34" charset="0"/>
-                <a:ea typeface="맑은 고딕"/>
-              </a:rPr>
-              <a:t>IdP</a:t>
-            </a:r>
-            <a:endParaRPr kumimoji="0" lang="ko-KR" altLang="en-US" sz="1200" b="1" i="0" u="none" strike="noStrike" kern="0" cap="none" spc="0" normalizeH="0" baseline="0" noProof="0" dirty="0">
-              <a:ln>
-                <a:noFill/>
-              </a:ln>
+            <a:endParaRPr lang="en-US" altLang="ko-KR" sz="1100" kern="0" dirty="0">
               <a:solidFill>
-                <a:schemeClr val="bg1">
-                  <a:lumMod val="50000"/>
-                </a:schemeClr>
+                <a:prstClr val="black"/>
               </a:solidFill>
-              <a:effectLst/>
-              <a:uLnTx/>
-              <a:uFillTx/>
               <a:latin typeface="Calibri" panose="020F0502020204030204" pitchFamily="34" charset="0"/>
               <a:ea typeface="맑은 고딕"/>
             </a:endParaRPr>
           </a:p>
         </p:txBody>
       </p:sp>
-      <p:pic>
-        <p:nvPicPr>
-          <p:cNvPr id="53" name="Picture 52">
-            <a:extLst>
-              <a:ext uri="{FF2B5EF4-FFF2-40B4-BE49-F238E27FC236}">
-                <a16:creationId xmlns:a16="http://schemas.microsoft.com/office/drawing/2014/main" id="{4B9686DF-FFFA-960D-E898-10ACD996ED84}"/>
-              </a:ext>
-            </a:extLst>
-          </p:cNvPr>
-          <p:cNvPicPr>
-            <a:picLocks noChangeAspect="1"/>
-          </p:cNvPicPr>
-          <p:nvPr/>
-        </p:nvPicPr>
-        <p:blipFill>
-          <a:blip r:embed="rId9"/>
-          <a:stretch>
-            <a:fillRect/>
-          </a:stretch>
-        </p:blipFill>
-        <p:spPr>
-          <a:xfrm>
-            <a:off x="7432175" y="1873203"/>
-            <a:ext cx="842591" cy="305632"/>
-          </a:xfrm>
-          <a:prstGeom prst="rect">
-            <a:avLst/>
-          </a:prstGeom>
-        </p:spPr>
-      </p:pic>
-      <p:sp>
-        <p:nvSpPr>
-          <p:cNvPr id="2" name="직사각형 363">
-            <a:extLst>
-              <a:ext uri="{FF2B5EF4-FFF2-40B4-BE49-F238E27FC236}">
-                <a16:creationId xmlns:a16="http://schemas.microsoft.com/office/drawing/2014/main" id="{50842FBC-583B-56B6-F325-01BC137C4C4D}"/>
+      <p:sp>
+        <p:nvSpPr>
+          <p:cNvPr id="104" name="직사각형 363">
+            <a:extLst>
+              <a:ext uri="{FF2B5EF4-FFF2-40B4-BE49-F238E27FC236}">
+                <a16:creationId xmlns:a16="http://schemas.microsoft.com/office/drawing/2014/main" id="{BCD152CC-1DC0-6B49-AEEE-8933C5526F2B}"/>
               </a:ext>
             </a:extLst>
           </p:cNvPr>
@@ -5915,7 +5996,7 @@
         </p:nvSpPr>
         <p:spPr>
           <a:xfrm>
-            <a:off x="4974332" y="2801316"/>
+            <a:off x="3781586" y="3656517"/>
             <a:ext cx="45719" cy="61556"/>
           </a:xfrm>
           <a:prstGeom prst="rect">

</xml_diff>